<commit_message>
app with some initial pseudo-funcionalities.
</commit_message>
<xml_diff>
--- a/docs/BLASCHEK_RESUMIDO.pptx
+++ b/docs/BLASCHEK_RESUMIDO.pptx
@@ -7,12 +7,13 @@
   <p:sldIdLst>
     <p:sldId id="256" r:id="rId2"/>
     <p:sldId id="257" r:id="rId3"/>
-    <p:sldId id="263" r:id="rId4"/>
-    <p:sldId id="258" r:id="rId5"/>
+    <p:sldId id="258" r:id="rId4"/>
+    <p:sldId id="263" r:id="rId5"/>
     <p:sldId id="261" r:id="rId6"/>
     <p:sldId id="259" r:id="rId7"/>
     <p:sldId id="262" r:id="rId8"/>
     <p:sldId id="260" r:id="rId9"/>
+    <p:sldId id="264" r:id="rId10"/>
   </p:sldIdLst>
   <p:sldSz cx="9144000" cy="6858000" type="screen4x3"/>
   <p:notesSz cx="6858000" cy="9144000"/>
@@ -111,6 +112,22 @@
       </a:defRPr>
     </a:lvl9pPr>
   </p:defaultTextStyle>
+  <p:extLst>
+    <p:ext uri="{EFAFB233-063F-42B5-8137-9DF3F51BA10A}">
+      <p15:sldGuideLst xmlns:p15="http://schemas.microsoft.com/office/powerpoint/2012/main">
+        <p15:guide id="1" orient="horz" pos="2160">
+          <p15:clr>
+            <a:srgbClr val="A4A3A4"/>
+          </p15:clr>
+        </p15:guide>
+        <p15:guide id="2" pos="2880">
+          <p15:clr>
+            <a:srgbClr val="A4A3A4"/>
+          </p15:clr>
+        </p15:guide>
+      </p15:sldGuideLst>
+    </p:ext>
+  </p:extLst>
 </p:presentation>
 </file>
 
@@ -295,7 +312,7 @@
           <a:p>
             <a:fld id="{3C80DD19-D024-4400-A954-6CE09382BC1B}" type="datetimeFigureOut">
               <a:rPr lang="pt-BR" smtClean="0"/>
-              <a:t>18/05/2020</a:t>
+              <a:t>21/05/2020</a:t>
             </a:fld>
             <a:endParaRPr lang="pt-BR"/>
           </a:p>
@@ -337,7 +354,7 @@
           <a:p>
             <a:fld id="{6CA535E8-7C78-4FB8-998A-23ABF04298F4}" type="slidenum">
               <a:rPr lang="pt-BR" smtClean="0"/>
-              <a:t>‹nº›</a:t>
+              <a:t>‹Nº›</a:t>
             </a:fld>
             <a:endParaRPr lang="pt-BR"/>
           </a:p>
@@ -465,7 +482,7 @@
           <a:p>
             <a:fld id="{3C80DD19-D024-4400-A954-6CE09382BC1B}" type="datetimeFigureOut">
               <a:rPr lang="pt-BR" smtClean="0"/>
-              <a:t>18/05/2020</a:t>
+              <a:t>21/05/2020</a:t>
             </a:fld>
             <a:endParaRPr lang="pt-BR"/>
           </a:p>
@@ -507,7 +524,7 @@
           <a:p>
             <a:fld id="{6CA535E8-7C78-4FB8-998A-23ABF04298F4}" type="slidenum">
               <a:rPr lang="pt-BR" smtClean="0"/>
-              <a:t>‹nº›</a:t>
+              <a:t>‹Nº›</a:t>
             </a:fld>
             <a:endParaRPr lang="pt-BR"/>
           </a:p>
@@ -645,7 +662,7 @@
           <a:p>
             <a:fld id="{3C80DD19-D024-4400-A954-6CE09382BC1B}" type="datetimeFigureOut">
               <a:rPr lang="pt-BR" smtClean="0"/>
-              <a:t>18/05/2020</a:t>
+              <a:t>21/05/2020</a:t>
             </a:fld>
             <a:endParaRPr lang="pt-BR"/>
           </a:p>
@@ -687,7 +704,7 @@
           <a:p>
             <a:fld id="{6CA535E8-7C78-4FB8-998A-23ABF04298F4}" type="slidenum">
               <a:rPr lang="pt-BR" smtClean="0"/>
-              <a:t>‹nº›</a:t>
+              <a:t>‹Nº›</a:t>
             </a:fld>
             <a:endParaRPr lang="pt-BR"/>
           </a:p>
@@ -815,7 +832,7 @@
           <a:p>
             <a:fld id="{3C80DD19-D024-4400-A954-6CE09382BC1B}" type="datetimeFigureOut">
               <a:rPr lang="pt-BR" smtClean="0"/>
-              <a:t>18/05/2020</a:t>
+              <a:t>21/05/2020</a:t>
             </a:fld>
             <a:endParaRPr lang="pt-BR"/>
           </a:p>
@@ -857,7 +874,7 @@
           <a:p>
             <a:fld id="{6CA535E8-7C78-4FB8-998A-23ABF04298F4}" type="slidenum">
               <a:rPr lang="pt-BR" smtClean="0"/>
-              <a:t>‹nº›</a:t>
+              <a:t>‹Nº›</a:t>
             </a:fld>
             <a:endParaRPr lang="pt-BR"/>
           </a:p>
@@ -1061,7 +1078,7 @@
           <a:p>
             <a:fld id="{3C80DD19-D024-4400-A954-6CE09382BC1B}" type="datetimeFigureOut">
               <a:rPr lang="pt-BR" smtClean="0"/>
-              <a:t>18/05/2020</a:t>
+              <a:t>21/05/2020</a:t>
             </a:fld>
             <a:endParaRPr lang="pt-BR"/>
           </a:p>
@@ -1103,7 +1120,7 @@
           <a:p>
             <a:fld id="{6CA535E8-7C78-4FB8-998A-23ABF04298F4}" type="slidenum">
               <a:rPr lang="pt-BR" smtClean="0"/>
-              <a:t>‹nº›</a:t>
+              <a:t>‹Nº›</a:t>
             </a:fld>
             <a:endParaRPr lang="pt-BR"/>
           </a:p>
@@ -1349,7 +1366,7 @@
           <a:p>
             <a:fld id="{3C80DD19-D024-4400-A954-6CE09382BC1B}" type="datetimeFigureOut">
               <a:rPr lang="pt-BR" smtClean="0"/>
-              <a:t>18/05/2020</a:t>
+              <a:t>21/05/2020</a:t>
             </a:fld>
             <a:endParaRPr lang="pt-BR"/>
           </a:p>
@@ -1391,7 +1408,7 @@
           <a:p>
             <a:fld id="{6CA535E8-7C78-4FB8-998A-23ABF04298F4}" type="slidenum">
               <a:rPr lang="pt-BR" smtClean="0"/>
-              <a:t>‹nº›</a:t>
+              <a:t>‹Nº›</a:t>
             </a:fld>
             <a:endParaRPr lang="pt-BR"/>
           </a:p>
@@ -1771,7 +1788,7 @@
           <a:p>
             <a:fld id="{3C80DD19-D024-4400-A954-6CE09382BC1B}" type="datetimeFigureOut">
               <a:rPr lang="pt-BR" smtClean="0"/>
-              <a:t>18/05/2020</a:t>
+              <a:t>21/05/2020</a:t>
             </a:fld>
             <a:endParaRPr lang="pt-BR"/>
           </a:p>
@@ -1813,7 +1830,7 @@
           <a:p>
             <a:fld id="{6CA535E8-7C78-4FB8-998A-23ABF04298F4}" type="slidenum">
               <a:rPr lang="pt-BR" smtClean="0"/>
-              <a:t>‹nº›</a:t>
+              <a:t>‹Nº›</a:t>
             </a:fld>
             <a:endParaRPr lang="pt-BR"/>
           </a:p>
@@ -1889,7 +1906,7 @@
           <a:p>
             <a:fld id="{3C80DD19-D024-4400-A954-6CE09382BC1B}" type="datetimeFigureOut">
               <a:rPr lang="pt-BR" smtClean="0"/>
-              <a:t>18/05/2020</a:t>
+              <a:t>21/05/2020</a:t>
             </a:fld>
             <a:endParaRPr lang="pt-BR"/>
           </a:p>
@@ -1931,7 +1948,7 @@
           <a:p>
             <a:fld id="{6CA535E8-7C78-4FB8-998A-23ABF04298F4}" type="slidenum">
               <a:rPr lang="pt-BR" smtClean="0"/>
-              <a:t>‹nº›</a:t>
+              <a:t>‹Nº›</a:t>
             </a:fld>
             <a:endParaRPr lang="pt-BR"/>
           </a:p>
@@ -1984,7 +2001,7 @@
           <a:p>
             <a:fld id="{3C80DD19-D024-4400-A954-6CE09382BC1B}" type="datetimeFigureOut">
               <a:rPr lang="pt-BR" smtClean="0"/>
-              <a:t>18/05/2020</a:t>
+              <a:t>21/05/2020</a:t>
             </a:fld>
             <a:endParaRPr lang="pt-BR"/>
           </a:p>
@@ -2026,7 +2043,7 @@
           <a:p>
             <a:fld id="{6CA535E8-7C78-4FB8-998A-23ABF04298F4}" type="slidenum">
               <a:rPr lang="pt-BR" smtClean="0"/>
-              <a:t>‹nº›</a:t>
+              <a:t>‹Nº›</a:t>
             </a:fld>
             <a:endParaRPr lang="pt-BR"/>
           </a:p>
@@ -2261,7 +2278,7 @@
           <a:p>
             <a:fld id="{3C80DD19-D024-4400-A954-6CE09382BC1B}" type="datetimeFigureOut">
               <a:rPr lang="pt-BR" smtClean="0"/>
-              <a:t>18/05/2020</a:t>
+              <a:t>21/05/2020</a:t>
             </a:fld>
             <a:endParaRPr lang="pt-BR"/>
           </a:p>
@@ -2303,7 +2320,7 @@
           <a:p>
             <a:fld id="{6CA535E8-7C78-4FB8-998A-23ABF04298F4}" type="slidenum">
               <a:rPr lang="pt-BR" smtClean="0"/>
-              <a:t>‹nº›</a:t>
+              <a:t>‹Nº›</a:t>
             </a:fld>
             <a:endParaRPr lang="pt-BR"/>
           </a:p>
@@ -2514,7 +2531,7 @@
           <a:p>
             <a:fld id="{3C80DD19-D024-4400-A954-6CE09382BC1B}" type="datetimeFigureOut">
               <a:rPr lang="pt-BR" smtClean="0"/>
-              <a:t>18/05/2020</a:t>
+              <a:t>21/05/2020</a:t>
             </a:fld>
             <a:endParaRPr lang="pt-BR"/>
           </a:p>
@@ -2556,7 +2573,7 @@
           <a:p>
             <a:fld id="{6CA535E8-7C78-4FB8-998A-23ABF04298F4}" type="slidenum">
               <a:rPr lang="pt-BR" smtClean="0"/>
-              <a:t>‹nº›</a:t>
+              <a:t>‹Nº›</a:t>
             </a:fld>
             <a:endParaRPr lang="pt-BR"/>
           </a:p>
@@ -2727,7 +2744,7 @@
           <a:p>
             <a:fld id="{3C80DD19-D024-4400-A954-6CE09382BC1B}" type="datetimeFigureOut">
               <a:rPr lang="pt-BR" smtClean="0"/>
-              <a:t>18/05/2020</a:t>
+              <a:t>21/05/2020</a:t>
             </a:fld>
             <a:endParaRPr lang="pt-BR"/>
           </a:p>
@@ -2805,7 +2822,7 @@
           <a:p>
             <a:fld id="{6CA535E8-7C78-4FB8-998A-23ABF04298F4}" type="slidenum">
               <a:rPr lang="pt-BR" smtClean="0"/>
-              <a:t>‹nº›</a:t>
+              <a:t>‹Nº›</a:t>
             </a:fld>
             <a:endParaRPr lang="pt-BR"/>
           </a:p>
@@ -3825,7 +3842,7 @@
         </p:nvSpPr>
         <p:spPr>
           <a:xfrm>
-            <a:off x="1039268" y="134048"/>
+            <a:off x="1039269" y="134048"/>
             <a:ext cx="6696744" cy="369332"/>
           </a:xfrm>
           <a:prstGeom prst="rect">
@@ -3847,7 +3864,7 @@
             <a:pPr algn="ctr"/>
             <a:r>
               <a:rPr lang="pt-BR" dirty="0" smtClean="0"/>
-              <a:t>LISTA DE CAMPANHAS</a:t>
+              <a:t>CADASTRO DE CAMPANHA</a:t>
             </a:r>
             <a:endParaRPr lang="pt-BR" dirty="0"/>
           </a:p>
@@ -3861,7 +3878,7 @@
         </p:nvSpPr>
         <p:spPr>
           <a:xfrm>
-            <a:off x="395536" y="921451"/>
+            <a:off x="1053124" y="908720"/>
             <a:ext cx="1584176" cy="369332"/>
           </a:xfrm>
           <a:prstGeom prst="rect">
@@ -3883,7 +3900,252 @@
             <a:pPr algn="ctr"/>
             <a:r>
               <a:rPr lang="pt-BR" dirty="0" smtClean="0"/>
-              <a:t>ATIVAS</a:t>
+              <a:t>FORMULARIO</a:t>
+            </a:r>
+            <a:endParaRPr lang="pt-BR" dirty="0"/>
+          </a:p>
+        </p:txBody>
+      </p:sp>
+      <p:sp>
+        <p:nvSpPr>
+          <p:cNvPr id="6" name="CaixaDeTexto 5"/>
+          <p:cNvSpPr txBox="1"/>
+          <p:nvPr/>
+        </p:nvSpPr>
+        <p:spPr>
+          <a:xfrm>
+            <a:off x="711706" y="2040542"/>
+            <a:ext cx="6930725" cy="369332"/>
+          </a:xfrm>
+          <a:prstGeom prst="rect">
+            <a:avLst/>
+          </a:prstGeom>
+          <a:noFill/>
+          <a:ln>
+            <a:solidFill>
+              <a:schemeClr val="tx1"/>
+            </a:solidFill>
+          </a:ln>
+        </p:spPr>
+        <p:txBody>
+          <a:bodyPr wrap="square" rtlCol="0">
+            <a:spAutoFit/>
+          </a:bodyPr>
+          <a:lstStyle/>
+          <a:p>
+            <a:r>
+              <a:rPr lang="pt-BR" dirty="0" smtClean="0"/>
+              <a:t>URL DA MARCA</a:t>
+            </a:r>
+            <a:endParaRPr lang="pt-BR" dirty="0"/>
+          </a:p>
+        </p:txBody>
+      </p:sp>
+      <p:sp>
+        <p:nvSpPr>
+          <p:cNvPr id="7" name="CaixaDeTexto 6"/>
+          <p:cNvSpPr txBox="1"/>
+          <p:nvPr/>
+        </p:nvSpPr>
+        <p:spPr>
+          <a:xfrm>
+            <a:off x="667941" y="4893613"/>
+            <a:ext cx="6930725" cy="369332"/>
+          </a:xfrm>
+          <a:prstGeom prst="rect">
+            <a:avLst/>
+          </a:prstGeom>
+          <a:noFill/>
+          <a:ln>
+            <a:solidFill>
+              <a:schemeClr val="tx1"/>
+            </a:solidFill>
+          </a:ln>
+        </p:spPr>
+        <p:txBody>
+          <a:bodyPr wrap="square" rtlCol="0">
+            <a:spAutoFit/>
+          </a:bodyPr>
+          <a:lstStyle/>
+          <a:p>
+            <a:r>
+              <a:rPr lang="pt-BR" dirty="0" smtClean="0"/>
+              <a:t>MARCAS PRA QUEM JÁ TRABALHOU</a:t>
+            </a:r>
+            <a:endParaRPr lang="pt-BR" dirty="0"/>
+          </a:p>
+        </p:txBody>
+      </p:sp>
+      <p:sp>
+        <p:nvSpPr>
+          <p:cNvPr id="11" name="CaixaDeTexto 10"/>
+          <p:cNvSpPr txBox="1"/>
+          <p:nvPr/>
+        </p:nvSpPr>
+        <p:spPr>
+          <a:xfrm>
+            <a:off x="711707" y="1420255"/>
+            <a:ext cx="6930725" cy="369332"/>
+          </a:xfrm>
+          <a:prstGeom prst="rect">
+            <a:avLst/>
+          </a:prstGeom>
+          <a:noFill/>
+          <a:ln>
+            <a:solidFill>
+              <a:schemeClr val="tx1"/>
+            </a:solidFill>
+          </a:ln>
+        </p:spPr>
+        <p:txBody>
+          <a:bodyPr wrap="square" rtlCol="0">
+            <a:spAutoFit/>
+          </a:bodyPr>
+          <a:lstStyle/>
+          <a:p>
+            <a:r>
+              <a:rPr lang="pt-BR" dirty="0" smtClean="0"/>
+              <a:t>NOME DA CAMPANHA</a:t>
+            </a:r>
+            <a:endParaRPr lang="pt-BR" dirty="0"/>
+          </a:p>
+        </p:txBody>
+      </p:sp>
+      <p:sp>
+        <p:nvSpPr>
+          <p:cNvPr id="12" name="CaixaDeTexto 11"/>
+          <p:cNvSpPr txBox="1"/>
+          <p:nvPr/>
+        </p:nvSpPr>
+        <p:spPr>
+          <a:xfrm>
+            <a:off x="711704" y="2617366"/>
+            <a:ext cx="6930725" cy="369332"/>
+          </a:xfrm>
+          <a:prstGeom prst="rect">
+            <a:avLst/>
+          </a:prstGeom>
+          <a:noFill/>
+          <a:ln>
+            <a:solidFill>
+              <a:schemeClr val="tx1"/>
+            </a:solidFill>
+          </a:ln>
+        </p:spPr>
+        <p:txBody>
+          <a:bodyPr wrap="square" rtlCol="0">
+            <a:spAutoFit/>
+          </a:bodyPr>
+          <a:lstStyle/>
+          <a:p>
+            <a:r>
+              <a:rPr lang="pt-BR" dirty="0" smtClean="0"/>
+              <a:t>BRIEFING</a:t>
+            </a:r>
+            <a:endParaRPr lang="pt-BR" dirty="0"/>
+          </a:p>
+        </p:txBody>
+      </p:sp>
+      <p:sp>
+        <p:nvSpPr>
+          <p:cNvPr id="13" name="CaixaDeTexto 12"/>
+          <p:cNvSpPr txBox="1"/>
+          <p:nvPr/>
+        </p:nvSpPr>
+        <p:spPr>
+          <a:xfrm>
+            <a:off x="711703" y="3166624"/>
+            <a:ext cx="6930725" cy="369332"/>
+          </a:xfrm>
+          <a:prstGeom prst="rect">
+            <a:avLst/>
+          </a:prstGeom>
+          <a:noFill/>
+          <a:ln>
+            <a:solidFill>
+              <a:schemeClr val="tx1"/>
+            </a:solidFill>
+          </a:ln>
+        </p:spPr>
+        <p:txBody>
+          <a:bodyPr wrap="square" rtlCol="0">
+            <a:spAutoFit/>
+          </a:bodyPr>
+          <a:lstStyle/>
+          <a:p>
+            <a:r>
+              <a:rPr lang="pt-BR" dirty="0" smtClean="0"/>
+              <a:t>UPLOAD DE MATERIAL </a:t>
+            </a:r>
+            <a:endParaRPr lang="pt-BR" dirty="0"/>
+          </a:p>
+        </p:txBody>
+      </p:sp>
+      <p:sp>
+        <p:nvSpPr>
+          <p:cNvPr id="14" name="CaixaDeTexto 13"/>
+          <p:cNvSpPr txBox="1"/>
+          <p:nvPr/>
+        </p:nvSpPr>
+        <p:spPr>
+          <a:xfrm>
+            <a:off x="682510" y="3767907"/>
+            <a:ext cx="6930725" cy="369332"/>
+          </a:xfrm>
+          <a:prstGeom prst="rect">
+            <a:avLst/>
+          </a:prstGeom>
+          <a:noFill/>
+          <a:ln>
+            <a:solidFill>
+              <a:schemeClr val="tx1"/>
+            </a:solidFill>
+          </a:ln>
+        </p:spPr>
+        <p:txBody>
+          <a:bodyPr wrap="square" rtlCol="0">
+            <a:spAutoFit/>
+          </a:bodyPr>
+          <a:lstStyle/>
+          <a:p>
+            <a:r>
+              <a:rPr lang="pt-BR" dirty="0" smtClean="0"/>
+              <a:t>BUDGET</a:t>
+            </a:r>
+            <a:endParaRPr lang="pt-BR" dirty="0"/>
+          </a:p>
+        </p:txBody>
+      </p:sp>
+      <p:sp>
+        <p:nvSpPr>
+          <p:cNvPr id="15" name="CaixaDeTexto 14"/>
+          <p:cNvSpPr txBox="1"/>
+          <p:nvPr/>
+        </p:nvSpPr>
+        <p:spPr>
+          <a:xfrm>
+            <a:off x="682508" y="4279446"/>
+            <a:ext cx="6930725" cy="369332"/>
+          </a:xfrm>
+          <a:prstGeom prst="rect">
+            <a:avLst/>
+          </a:prstGeom>
+          <a:noFill/>
+          <a:ln>
+            <a:solidFill>
+              <a:schemeClr val="tx1"/>
+            </a:solidFill>
+          </a:ln>
+        </p:spPr>
+        <p:txBody>
+          <a:bodyPr wrap="square" rtlCol="0">
+            <a:spAutoFit/>
+          </a:bodyPr>
+          <a:lstStyle/>
+          <a:p>
+            <a:r>
+              <a:rPr lang="pt-BR" dirty="0" smtClean="0"/>
+              <a:t>VALOR DE REMUNERAÇÃO POR CPM ou CPC</a:t>
             </a:r>
             <a:endParaRPr lang="pt-BR" dirty="0"/>
           </a:p>
@@ -3937,7 +4199,7 @@
         </p:nvSpPr>
         <p:spPr>
           <a:xfrm>
-            <a:off x="2236382" y="921451"/>
+            <a:off x="2780782" y="908720"/>
             <a:ext cx="2151258" cy="369332"/>
           </a:xfrm>
           <a:prstGeom prst="rect">
@@ -3959,21 +4221,21 @@
             <a:pPr algn="ctr"/>
             <a:r>
               <a:rPr lang="pt-BR" dirty="0" smtClean="0"/>
-              <a:t>INATVAS</a:t>
-            </a:r>
-            <a:endParaRPr lang="pt-BR" dirty="0"/>
-          </a:p>
-        </p:txBody>
-      </p:sp>
-      <p:sp>
-        <p:nvSpPr>
-          <p:cNvPr id="18" name="CaixaDeTexto 17"/>
-          <p:cNvSpPr txBox="1"/>
-          <p:nvPr/>
-        </p:nvSpPr>
-        <p:spPr>
-          <a:xfrm>
-            <a:off x="251520" y="1844824"/>
+              <a:t>IMAGEM DA MARCA</a:t>
+            </a:r>
+            <a:endParaRPr lang="pt-BR" dirty="0"/>
+          </a:p>
+        </p:txBody>
+      </p:sp>
+      <p:sp>
+        <p:nvSpPr>
+          <p:cNvPr id="17" name="CaixaDeTexto 16"/>
+          <p:cNvSpPr txBox="1"/>
+          <p:nvPr/>
+        </p:nvSpPr>
+        <p:spPr>
+          <a:xfrm>
+            <a:off x="5084261" y="908720"/>
             <a:ext cx="2651751" cy="369332"/>
           </a:xfrm>
           <a:prstGeom prst="rect">
@@ -4001,514 +4263,10 @@
           </a:p>
         </p:txBody>
       </p:sp>
-      <p:sp>
-        <p:nvSpPr>
-          <p:cNvPr id="3" name="CaixaDeTexto 2"/>
-          <p:cNvSpPr txBox="1"/>
-          <p:nvPr/>
-        </p:nvSpPr>
-        <p:spPr>
-          <a:xfrm>
-            <a:off x="3131840" y="1844824"/>
-            <a:ext cx="3058180" cy="369332"/>
-          </a:xfrm>
-          <a:prstGeom prst="rect">
-            <a:avLst/>
-          </a:prstGeom>
-          <a:noFill/>
-          <a:ln>
-            <a:solidFill>
-              <a:schemeClr val="tx1"/>
-            </a:solidFill>
-          </a:ln>
-        </p:spPr>
-        <p:txBody>
-          <a:bodyPr wrap="square" rtlCol="0">
-            <a:spAutoFit/>
-          </a:bodyPr>
-          <a:lstStyle/>
-          <a:p>
-            <a:r>
-              <a:rPr lang="pt-BR" dirty="0" smtClean="0"/>
-              <a:t>RESUMO CAMPANHA</a:t>
-            </a:r>
-            <a:endParaRPr lang="pt-BR" dirty="0"/>
-          </a:p>
-        </p:txBody>
-      </p:sp>
-      <p:sp>
-        <p:nvSpPr>
-          <p:cNvPr id="8" name="Retângulo 7"/>
-          <p:cNvSpPr/>
-          <p:nvPr/>
-        </p:nvSpPr>
-        <p:spPr>
-          <a:xfrm>
-            <a:off x="6953944" y="1844824"/>
-            <a:ext cx="1434480" cy="369332"/>
-          </a:xfrm>
-          <a:prstGeom prst="rect">
-            <a:avLst/>
-          </a:prstGeom>
-        </p:spPr>
-        <p:style>
-          <a:lnRef idx="2">
-            <a:schemeClr val="accent1">
-              <a:shade val="50000"/>
-            </a:schemeClr>
-          </a:lnRef>
-          <a:fillRef idx="1">
-            <a:schemeClr val="accent1"/>
-          </a:fillRef>
-          <a:effectRef idx="0">
-            <a:schemeClr val="accent1"/>
-          </a:effectRef>
-          <a:fontRef idx="minor">
-            <a:schemeClr val="lt1"/>
-          </a:fontRef>
-        </p:style>
-        <p:txBody>
-          <a:bodyPr rtlCol="0" anchor="ctr"/>
-          <a:lstStyle/>
-          <a:p>
-            <a:pPr algn="ctr"/>
-            <a:r>
-              <a:rPr lang="pt-BR" dirty="0" smtClean="0"/>
-              <a:t>CANDIDATAR</a:t>
-            </a:r>
-            <a:endParaRPr lang="pt-BR" dirty="0"/>
-          </a:p>
-        </p:txBody>
-      </p:sp>
-      <p:sp>
-        <p:nvSpPr>
-          <p:cNvPr id="19" name="CaixaDeTexto 18"/>
-          <p:cNvSpPr txBox="1"/>
-          <p:nvPr/>
-        </p:nvSpPr>
-        <p:spPr>
-          <a:xfrm>
-            <a:off x="251520" y="2492896"/>
-            <a:ext cx="2651751" cy="369332"/>
-          </a:xfrm>
-          <a:prstGeom prst="rect">
-            <a:avLst/>
-          </a:prstGeom>
-          <a:noFill/>
-          <a:ln>
-            <a:solidFill>
-              <a:schemeClr val="tx1"/>
-            </a:solidFill>
-          </a:ln>
-        </p:spPr>
-        <p:txBody>
-          <a:bodyPr wrap="square" rtlCol="0">
-            <a:spAutoFit/>
-          </a:bodyPr>
-          <a:lstStyle/>
-          <a:p>
-            <a:pPr algn="ctr"/>
-            <a:r>
-              <a:rPr lang="pt-BR" dirty="0" smtClean="0"/>
-              <a:t>IMAGEM DA CAMPANHA</a:t>
-            </a:r>
-            <a:endParaRPr lang="pt-BR" dirty="0"/>
-          </a:p>
-        </p:txBody>
-      </p:sp>
-      <p:sp>
-        <p:nvSpPr>
-          <p:cNvPr id="20" name="CaixaDeTexto 19"/>
-          <p:cNvSpPr txBox="1"/>
-          <p:nvPr/>
-        </p:nvSpPr>
-        <p:spPr>
-          <a:xfrm>
-            <a:off x="3131840" y="2492896"/>
-            <a:ext cx="3058180" cy="369332"/>
-          </a:xfrm>
-          <a:prstGeom prst="rect">
-            <a:avLst/>
-          </a:prstGeom>
-          <a:noFill/>
-          <a:ln>
-            <a:solidFill>
-              <a:schemeClr val="tx1"/>
-            </a:solidFill>
-          </a:ln>
-        </p:spPr>
-        <p:txBody>
-          <a:bodyPr wrap="square" rtlCol="0">
-            <a:spAutoFit/>
-          </a:bodyPr>
-          <a:lstStyle/>
-          <a:p>
-            <a:r>
-              <a:rPr lang="pt-BR" dirty="0" smtClean="0"/>
-              <a:t>RESUMO CAMPANHA</a:t>
-            </a:r>
-            <a:endParaRPr lang="pt-BR" dirty="0"/>
-          </a:p>
-        </p:txBody>
-      </p:sp>
-      <p:sp>
-        <p:nvSpPr>
-          <p:cNvPr id="21" name="Retângulo 20"/>
-          <p:cNvSpPr/>
-          <p:nvPr/>
-        </p:nvSpPr>
-        <p:spPr>
-          <a:xfrm>
-            <a:off x="6953944" y="2492896"/>
-            <a:ext cx="1434480" cy="369332"/>
-          </a:xfrm>
-          <a:prstGeom prst="rect">
-            <a:avLst/>
-          </a:prstGeom>
-        </p:spPr>
-        <p:style>
-          <a:lnRef idx="2">
-            <a:schemeClr val="accent1">
-              <a:shade val="50000"/>
-            </a:schemeClr>
-          </a:lnRef>
-          <a:fillRef idx="1">
-            <a:schemeClr val="accent1"/>
-          </a:fillRef>
-          <a:effectRef idx="0">
-            <a:schemeClr val="accent1"/>
-          </a:effectRef>
-          <a:fontRef idx="minor">
-            <a:schemeClr val="lt1"/>
-          </a:fontRef>
-        </p:style>
-        <p:txBody>
-          <a:bodyPr rtlCol="0" anchor="ctr"/>
-          <a:lstStyle/>
-          <a:p>
-            <a:pPr algn="ctr"/>
-            <a:r>
-              <a:rPr lang="pt-BR" dirty="0" smtClean="0"/>
-              <a:t>CANDIDATAR</a:t>
-            </a:r>
-            <a:endParaRPr lang="pt-BR" dirty="0"/>
-          </a:p>
-        </p:txBody>
-      </p:sp>
-      <p:sp>
-        <p:nvSpPr>
-          <p:cNvPr id="22" name="CaixaDeTexto 21"/>
-          <p:cNvSpPr txBox="1"/>
-          <p:nvPr/>
-        </p:nvSpPr>
-        <p:spPr>
-          <a:xfrm>
-            <a:off x="267932" y="3198388"/>
-            <a:ext cx="2651751" cy="369332"/>
-          </a:xfrm>
-          <a:prstGeom prst="rect">
-            <a:avLst/>
-          </a:prstGeom>
-          <a:noFill/>
-          <a:ln>
-            <a:solidFill>
-              <a:schemeClr val="tx1"/>
-            </a:solidFill>
-          </a:ln>
-        </p:spPr>
-        <p:txBody>
-          <a:bodyPr wrap="square" rtlCol="0">
-            <a:spAutoFit/>
-          </a:bodyPr>
-          <a:lstStyle/>
-          <a:p>
-            <a:pPr algn="ctr"/>
-            <a:r>
-              <a:rPr lang="pt-BR" dirty="0" smtClean="0"/>
-              <a:t>IMAGEM DA CAMPANHA</a:t>
-            </a:r>
-            <a:endParaRPr lang="pt-BR" dirty="0"/>
-          </a:p>
-        </p:txBody>
-      </p:sp>
-      <p:sp>
-        <p:nvSpPr>
-          <p:cNvPr id="23" name="CaixaDeTexto 22"/>
-          <p:cNvSpPr txBox="1"/>
-          <p:nvPr/>
-        </p:nvSpPr>
-        <p:spPr>
-          <a:xfrm>
-            <a:off x="3148252" y="3198388"/>
-            <a:ext cx="3058180" cy="369332"/>
-          </a:xfrm>
-          <a:prstGeom prst="rect">
-            <a:avLst/>
-          </a:prstGeom>
-          <a:noFill/>
-          <a:ln>
-            <a:solidFill>
-              <a:schemeClr val="tx1"/>
-            </a:solidFill>
-          </a:ln>
-        </p:spPr>
-        <p:txBody>
-          <a:bodyPr wrap="square" rtlCol="0">
-            <a:spAutoFit/>
-          </a:bodyPr>
-          <a:lstStyle/>
-          <a:p>
-            <a:r>
-              <a:rPr lang="pt-BR" dirty="0" smtClean="0"/>
-              <a:t>RESUMO CAMPANHA</a:t>
-            </a:r>
-            <a:endParaRPr lang="pt-BR" dirty="0"/>
-          </a:p>
-        </p:txBody>
-      </p:sp>
-      <p:sp>
-        <p:nvSpPr>
-          <p:cNvPr id="24" name="Retângulo 23"/>
-          <p:cNvSpPr/>
-          <p:nvPr/>
-        </p:nvSpPr>
-        <p:spPr>
-          <a:xfrm>
-            <a:off x="6970356" y="3198388"/>
-            <a:ext cx="1434480" cy="369332"/>
-          </a:xfrm>
-          <a:prstGeom prst="rect">
-            <a:avLst/>
-          </a:prstGeom>
-        </p:spPr>
-        <p:style>
-          <a:lnRef idx="2">
-            <a:schemeClr val="accent1">
-              <a:shade val="50000"/>
-            </a:schemeClr>
-          </a:lnRef>
-          <a:fillRef idx="1">
-            <a:schemeClr val="accent1"/>
-          </a:fillRef>
-          <a:effectRef idx="0">
-            <a:schemeClr val="accent1"/>
-          </a:effectRef>
-          <a:fontRef idx="minor">
-            <a:schemeClr val="lt1"/>
-          </a:fontRef>
-        </p:style>
-        <p:txBody>
-          <a:bodyPr rtlCol="0" anchor="ctr"/>
-          <a:lstStyle/>
-          <a:p>
-            <a:pPr algn="ctr"/>
-            <a:r>
-              <a:rPr lang="pt-BR" dirty="0" smtClean="0"/>
-              <a:t>CANDIDATAR</a:t>
-            </a:r>
-            <a:endParaRPr lang="pt-BR" dirty="0"/>
-          </a:p>
-        </p:txBody>
-      </p:sp>
-      <p:sp>
-        <p:nvSpPr>
-          <p:cNvPr id="25" name="CaixaDeTexto 24"/>
-          <p:cNvSpPr txBox="1"/>
-          <p:nvPr/>
-        </p:nvSpPr>
-        <p:spPr>
-          <a:xfrm>
-            <a:off x="269179" y="3933056"/>
-            <a:ext cx="2651751" cy="369332"/>
-          </a:xfrm>
-          <a:prstGeom prst="rect">
-            <a:avLst/>
-          </a:prstGeom>
-          <a:noFill/>
-          <a:ln>
-            <a:solidFill>
-              <a:schemeClr val="tx1"/>
-            </a:solidFill>
-          </a:ln>
-        </p:spPr>
-        <p:txBody>
-          <a:bodyPr wrap="square" rtlCol="0">
-            <a:spAutoFit/>
-          </a:bodyPr>
-          <a:lstStyle/>
-          <a:p>
-            <a:pPr algn="ctr"/>
-            <a:r>
-              <a:rPr lang="pt-BR" dirty="0" smtClean="0"/>
-              <a:t>IMAGEM DA CAMPANHA</a:t>
-            </a:r>
-            <a:endParaRPr lang="pt-BR" dirty="0"/>
-          </a:p>
-        </p:txBody>
-      </p:sp>
-      <p:sp>
-        <p:nvSpPr>
-          <p:cNvPr id="26" name="CaixaDeTexto 25"/>
-          <p:cNvSpPr txBox="1"/>
-          <p:nvPr/>
-        </p:nvSpPr>
-        <p:spPr>
-          <a:xfrm>
-            <a:off x="3149499" y="3933056"/>
-            <a:ext cx="3058180" cy="369332"/>
-          </a:xfrm>
-          <a:prstGeom prst="rect">
-            <a:avLst/>
-          </a:prstGeom>
-          <a:noFill/>
-          <a:ln>
-            <a:solidFill>
-              <a:schemeClr val="tx1"/>
-            </a:solidFill>
-          </a:ln>
-        </p:spPr>
-        <p:txBody>
-          <a:bodyPr wrap="square" rtlCol="0">
-            <a:spAutoFit/>
-          </a:bodyPr>
-          <a:lstStyle/>
-          <a:p>
-            <a:r>
-              <a:rPr lang="pt-BR" dirty="0" smtClean="0"/>
-              <a:t>RESUMO CAMPANHA</a:t>
-            </a:r>
-            <a:endParaRPr lang="pt-BR" dirty="0"/>
-          </a:p>
-        </p:txBody>
-      </p:sp>
-      <p:sp>
-        <p:nvSpPr>
-          <p:cNvPr id="27" name="Retângulo 26"/>
-          <p:cNvSpPr/>
-          <p:nvPr/>
-        </p:nvSpPr>
-        <p:spPr>
-          <a:xfrm>
-            <a:off x="6971603" y="3933056"/>
-            <a:ext cx="1434480" cy="369332"/>
-          </a:xfrm>
-          <a:prstGeom prst="rect">
-            <a:avLst/>
-          </a:prstGeom>
-        </p:spPr>
-        <p:style>
-          <a:lnRef idx="2">
-            <a:schemeClr val="accent1">
-              <a:shade val="50000"/>
-            </a:schemeClr>
-          </a:lnRef>
-          <a:fillRef idx="1">
-            <a:schemeClr val="accent1"/>
-          </a:fillRef>
-          <a:effectRef idx="0">
-            <a:schemeClr val="accent1"/>
-          </a:effectRef>
-          <a:fontRef idx="minor">
-            <a:schemeClr val="lt1"/>
-          </a:fontRef>
-        </p:style>
-        <p:txBody>
-          <a:bodyPr rtlCol="0" anchor="ctr"/>
-          <a:lstStyle/>
-          <a:p>
-            <a:pPr algn="ctr"/>
-            <a:r>
-              <a:rPr lang="pt-BR" dirty="0" smtClean="0"/>
-              <a:t>CANDIDATAR</a:t>
-            </a:r>
-            <a:endParaRPr lang="pt-BR" dirty="0"/>
-          </a:p>
-        </p:txBody>
-      </p:sp>
-      <p:sp>
-        <p:nvSpPr>
-          <p:cNvPr id="28" name="CaixaDeTexto 27"/>
-          <p:cNvSpPr txBox="1"/>
-          <p:nvPr/>
-        </p:nvSpPr>
-        <p:spPr>
-          <a:xfrm>
-            <a:off x="4641869" y="961892"/>
-            <a:ext cx="3071548" cy="369332"/>
-          </a:xfrm>
-          <a:prstGeom prst="rect">
-            <a:avLst/>
-          </a:prstGeom>
-          <a:noFill/>
-          <a:ln>
-            <a:solidFill>
-              <a:schemeClr val="tx1"/>
-            </a:solidFill>
-          </a:ln>
-        </p:spPr>
-        <p:txBody>
-          <a:bodyPr wrap="square" rtlCol="0">
-            <a:spAutoFit/>
-          </a:bodyPr>
-          <a:lstStyle/>
-          <a:p>
-            <a:pPr algn="ctr"/>
-            <a:r>
-              <a:rPr lang="pt-BR" dirty="0" smtClean="0"/>
-              <a:t>MINHAS CAMPANHAS</a:t>
-            </a:r>
-            <a:endParaRPr lang="pt-BR" dirty="0"/>
-          </a:p>
-        </p:txBody>
-      </p:sp>
-      <p:sp>
-        <p:nvSpPr>
-          <p:cNvPr id="9" name="Retângulo 8"/>
-          <p:cNvSpPr/>
-          <p:nvPr/>
-        </p:nvSpPr>
-        <p:spPr>
-          <a:xfrm>
-            <a:off x="8037454" y="961892"/>
-            <a:ext cx="936104" cy="328891"/>
-          </a:xfrm>
-          <a:prstGeom prst="rect">
-            <a:avLst/>
-          </a:prstGeom>
-        </p:spPr>
-        <p:style>
-          <a:lnRef idx="2">
-            <a:schemeClr val="accent1">
-              <a:shade val="50000"/>
-            </a:schemeClr>
-          </a:lnRef>
-          <a:fillRef idx="1">
-            <a:schemeClr val="accent1"/>
-          </a:fillRef>
-          <a:effectRef idx="0">
-            <a:schemeClr val="accent1"/>
-          </a:effectRef>
-          <a:fontRef idx="minor">
-            <a:schemeClr val="lt1"/>
-          </a:fontRef>
-        </p:style>
-        <p:txBody>
-          <a:bodyPr rtlCol="0" anchor="ctr"/>
-          <a:lstStyle/>
-          <a:p>
-            <a:pPr algn="ctr"/>
-            <a:r>
-              <a:rPr lang="pt-BR" dirty="0" smtClean="0"/>
-              <a:t>FILTRAR</a:t>
-            </a:r>
-            <a:endParaRPr lang="pt-BR" dirty="0"/>
-          </a:p>
-        </p:txBody>
-      </p:sp>
     </p:spTree>
     <p:extLst>
       <p:ext uri="{BB962C8B-B14F-4D97-AF65-F5344CB8AC3E}">
-        <p14:creationId xmlns:p14="http://schemas.microsoft.com/office/powerpoint/2010/main" val="4014494303"/>
+        <p14:creationId xmlns:p14="http://schemas.microsoft.com/office/powerpoint/2010/main" val="1651503836"/>
       </p:ext>
     </p:extLst>
   </p:cSld>
@@ -4550,7 +4308,7 @@
         </p:nvSpPr>
         <p:spPr>
           <a:xfrm>
-            <a:off x="1039269" y="134048"/>
+            <a:off x="1039268" y="134048"/>
             <a:ext cx="6696744" cy="369332"/>
           </a:xfrm>
           <a:prstGeom prst="rect">
@@ -4572,7 +4330,7 @@
             <a:pPr algn="ctr"/>
             <a:r>
               <a:rPr lang="pt-BR" dirty="0" smtClean="0"/>
-              <a:t>CADASTRO DE CAMPANHA</a:t>
+              <a:t>LISTA DE CAMPANHAS</a:t>
             </a:r>
             <a:endParaRPr lang="pt-BR" dirty="0"/>
           </a:p>
@@ -4586,7 +4344,7 @@
         </p:nvSpPr>
         <p:spPr>
           <a:xfrm>
-            <a:off x="1053124" y="908720"/>
+            <a:off x="395536" y="921451"/>
             <a:ext cx="1584176" cy="369332"/>
           </a:xfrm>
           <a:prstGeom prst="rect">
@@ -4608,252 +4366,7 @@
             <a:pPr algn="ctr"/>
             <a:r>
               <a:rPr lang="pt-BR" dirty="0" smtClean="0"/>
-              <a:t>FORMULARIO</a:t>
-            </a:r>
-            <a:endParaRPr lang="pt-BR" dirty="0"/>
-          </a:p>
-        </p:txBody>
-      </p:sp>
-      <p:sp>
-        <p:nvSpPr>
-          <p:cNvPr id="6" name="CaixaDeTexto 5"/>
-          <p:cNvSpPr txBox="1"/>
-          <p:nvPr/>
-        </p:nvSpPr>
-        <p:spPr>
-          <a:xfrm>
-            <a:off x="711706" y="2040542"/>
-            <a:ext cx="6930725" cy="369332"/>
-          </a:xfrm>
-          <a:prstGeom prst="rect">
-            <a:avLst/>
-          </a:prstGeom>
-          <a:noFill/>
-          <a:ln>
-            <a:solidFill>
-              <a:schemeClr val="tx1"/>
-            </a:solidFill>
-          </a:ln>
-        </p:spPr>
-        <p:txBody>
-          <a:bodyPr wrap="square" rtlCol="0">
-            <a:spAutoFit/>
-          </a:bodyPr>
-          <a:lstStyle/>
-          <a:p>
-            <a:r>
-              <a:rPr lang="pt-BR" dirty="0" smtClean="0"/>
-              <a:t>URL DA MARCA</a:t>
-            </a:r>
-            <a:endParaRPr lang="pt-BR" dirty="0"/>
-          </a:p>
-        </p:txBody>
-      </p:sp>
-      <p:sp>
-        <p:nvSpPr>
-          <p:cNvPr id="7" name="CaixaDeTexto 6"/>
-          <p:cNvSpPr txBox="1"/>
-          <p:nvPr/>
-        </p:nvSpPr>
-        <p:spPr>
-          <a:xfrm>
-            <a:off x="667941" y="4893613"/>
-            <a:ext cx="6930725" cy="369332"/>
-          </a:xfrm>
-          <a:prstGeom prst="rect">
-            <a:avLst/>
-          </a:prstGeom>
-          <a:noFill/>
-          <a:ln>
-            <a:solidFill>
-              <a:schemeClr val="tx1"/>
-            </a:solidFill>
-          </a:ln>
-        </p:spPr>
-        <p:txBody>
-          <a:bodyPr wrap="square" rtlCol="0">
-            <a:spAutoFit/>
-          </a:bodyPr>
-          <a:lstStyle/>
-          <a:p>
-            <a:r>
-              <a:rPr lang="pt-BR" dirty="0" smtClean="0"/>
-              <a:t>MARCAS PRA QUEM JÁ TRABALHOU</a:t>
-            </a:r>
-            <a:endParaRPr lang="pt-BR" dirty="0"/>
-          </a:p>
-        </p:txBody>
-      </p:sp>
-      <p:sp>
-        <p:nvSpPr>
-          <p:cNvPr id="11" name="CaixaDeTexto 10"/>
-          <p:cNvSpPr txBox="1"/>
-          <p:nvPr/>
-        </p:nvSpPr>
-        <p:spPr>
-          <a:xfrm>
-            <a:off x="711707" y="1420255"/>
-            <a:ext cx="6930725" cy="369332"/>
-          </a:xfrm>
-          <a:prstGeom prst="rect">
-            <a:avLst/>
-          </a:prstGeom>
-          <a:noFill/>
-          <a:ln>
-            <a:solidFill>
-              <a:schemeClr val="tx1"/>
-            </a:solidFill>
-          </a:ln>
-        </p:spPr>
-        <p:txBody>
-          <a:bodyPr wrap="square" rtlCol="0">
-            <a:spAutoFit/>
-          </a:bodyPr>
-          <a:lstStyle/>
-          <a:p>
-            <a:r>
-              <a:rPr lang="pt-BR" dirty="0" smtClean="0"/>
-              <a:t>NOME DA CAMPANHA</a:t>
-            </a:r>
-            <a:endParaRPr lang="pt-BR" dirty="0"/>
-          </a:p>
-        </p:txBody>
-      </p:sp>
-      <p:sp>
-        <p:nvSpPr>
-          <p:cNvPr id="12" name="CaixaDeTexto 11"/>
-          <p:cNvSpPr txBox="1"/>
-          <p:nvPr/>
-        </p:nvSpPr>
-        <p:spPr>
-          <a:xfrm>
-            <a:off x="711704" y="2617366"/>
-            <a:ext cx="6930725" cy="369332"/>
-          </a:xfrm>
-          <a:prstGeom prst="rect">
-            <a:avLst/>
-          </a:prstGeom>
-          <a:noFill/>
-          <a:ln>
-            <a:solidFill>
-              <a:schemeClr val="tx1"/>
-            </a:solidFill>
-          </a:ln>
-        </p:spPr>
-        <p:txBody>
-          <a:bodyPr wrap="square" rtlCol="0">
-            <a:spAutoFit/>
-          </a:bodyPr>
-          <a:lstStyle/>
-          <a:p>
-            <a:r>
-              <a:rPr lang="pt-BR" dirty="0" smtClean="0"/>
-              <a:t>BRIEFING</a:t>
-            </a:r>
-            <a:endParaRPr lang="pt-BR" dirty="0"/>
-          </a:p>
-        </p:txBody>
-      </p:sp>
-      <p:sp>
-        <p:nvSpPr>
-          <p:cNvPr id="13" name="CaixaDeTexto 12"/>
-          <p:cNvSpPr txBox="1"/>
-          <p:nvPr/>
-        </p:nvSpPr>
-        <p:spPr>
-          <a:xfrm>
-            <a:off x="711703" y="3166624"/>
-            <a:ext cx="6930725" cy="369332"/>
-          </a:xfrm>
-          <a:prstGeom prst="rect">
-            <a:avLst/>
-          </a:prstGeom>
-          <a:noFill/>
-          <a:ln>
-            <a:solidFill>
-              <a:schemeClr val="tx1"/>
-            </a:solidFill>
-          </a:ln>
-        </p:spPr>
-        <p:txBody>
-          <a:bodyPr wrap="square" rtlCol="0">
-            <a:spAutoFit/>
-          </a:bodyPr>
-          <a:lstStyle/>
-          <a:p>
-            <a:r>
-              <a:rPr lang="pt-BR" dirty="0" smtClean="0"/>
-              <a:t>UPLOAD DE MATERIAL </a:t>
-            </a:r>
-            <a:endParaRPr lang="pt-BR" dirty="0"/>
-          </a:p>
-        </p:txBody>
-      </p:sp>
-      <p:sp>
-        <p:nvSpPr>
-          <p:cNvPr id="14" name="CaixaDeTexto 13"/>
-          <p:cNvSpPr txBox="1"/>
-          <p:nvPr/>
-        </p:nvSpPr>
-        <p:spPr>
-          <a:xfrm>
-            <a:off x="682510" y="3767907"/>
-            <a:ext cx="6930725" cy="369332"/>
-          </a:xfrm>
-          <a:prstGeom prst="rect">
-            <a:avLst/>
-          </a:prstGeom>
-          <a:noFill/>
-          <a:ln>
-            <a:solidFill>
-              <a:schemeClr val="tx1"/>
-            </a:solidFill>
-          </a:ln>
-        </p:spPr>
-        <p:txBody>
-          <a:bodyPr wrap="square" rtlCol="0">
-            <a:spAutoFit/>
-          </a:bodyPr>
-          <a:lstStyle/>
-          <a:p>
-            <a:r>
-              <a:rPr lang="pt-BR" dirty="0" smtClean="0"/>
-              <a:t>BUDGET</a:t>
-            </a:r>
-            <a:endParaRPr lang="pt-BR" dirty="0"/>
-          </a:p>
-        </p:txBody>
-      </p:sp>
-      <p:sp>
-        <p:nvSpPr>
-          <p:cNvPr id="15" name="CaixaDeTexto 14"/>
-          <p:cNvSpPr txBox="1"/>
-          <p:nvPr/>
-        </p:nvSpPr>
-        <p:spPr>
-          <a:xfrm>
-            <a:off x="682508" y="4279446"/>
-            <a:ext cx="6930725" cy="369332"/>
-          </a:xfrm>
-          <a:prstGeom prst="rect">
-            <a:avLst/>
-          </a:prstGeom>
-          <a:noFill/>
-          <a:ln>
-            <a:solidFill>
-              <a:schemeClr val="tx1"/>
-            </a:solidFill>
-          </a:ln>
-        </p:spPr>
-        <p:txBody>
-          <a:bodyPr wrap="square" rtlCol="0">
-            <a:spAutoFit/>
-          </a:bodyPr>
-          <a:lstStyle/>
-          <a:p>
-            <a:r>
-              <a:rPr lang="pt-BR" dirty="0" smtClean="0"/>
-              <a:t>VALOR DE REMUNERAÇÃO POR CPM ou CPC</a:t>
+              <a:t>ATIVAS</a:t>
             </a:r>
             <a:endParaRPr lang="pt-BR" dirty="0"/>
           </a:p>
@@ -4907,7 +4420,7 @@
         </p:nvSpPr>
         <p:spPr>
           <a:xfrm>
-            <a:off x="2780782" y="908720"/>
+            <a:off x="2236382" y="921451"/>
             <a:ext cx="2151258" cy="369332"/>
           </a:xfrm>
           <a:prstGeom prst="rect">
@@ -4929,21 +4442,21 @@
             <a:pPr algn="ctr"/>
             <a:r>
               <a:rPr lang="pt-BR" dirty="0" smtClean="0"/>
-              <a:t>IMAGEM DA MARCA</a:t>
-            </a:r>
-            <a:endParaRPr lang="pt-BR" dirty="0"/>
-          </a:p>
-        </p:txBody>
-      </p:sp>
-      <p:sp>
-        <p:nvSpPr>
-          <p:cNvPr id="17" name="CaixaDeTexto 16"/>
-          <p:cNvSpPr txBox="1"/>
-          <p:nvPr/>
-        </p:nvSpPr>
-        <p:spPr>
-          <a:xfrm>
-            <a:off x="5084261" y="908720"/>
+              <a:t>INATVAS</a:t>
+            </a:r>
+            <a:endParaRPr lang="pt-BR" dirty="0"/>
+          </a:p>
+        </p:txBody>
+      </p:sp>
+      <p:sp>
+        <p:nvSpPr>
+          <p:cNvPr id="18" name="CaixaDeTexto 17"/>
+          <p:cNvSpPr txBox="1"/>
+          <p:nvPr/>
+        </p:nvSpPr>
+        <p:spPr>
+          <a:xfrm>
+            <a:off x="251520" y="1844824"/>
             <a:ext cx="2651751" cy="369332"/>
           </a:xfrm>
           <a:prstGeom prst="rect">
@@ -4971,10 +4484,514 @@
           </a:p>
         </p:txBody>
       </p:sp>
+      <p:sp>
+        <p:nvSpPr>
+          <p:cNvPr id="3" name="CaixaDeTexto 2"/>
+          <p:cNvSpPr txBox="1"/>
+          <p:nvPr/>
+        </p:nvSpPr>
+        <p:spPr>
+          <a:xfrm>
+            <a:off x="3131840" y="1844824"/>
+            <a:ext cx="3058180" cy="369332"/>
+          </a:xfrm>
+          <a:prstGeom prst="rect">
+            <a:avLst/>
+          </a:prstGeom>
+          <a:noFill/>
+          <a:ln>
+            <a:solidFill>
+              <a:schemeClr val="tx1"/>
+            </a:solidFill>
+          </a:ln>
+        </p:spPr>
+        <p:txBody>
+          <a:bodyPr wrap="square" rtlCol="0">
+            <a:spAutoFit/>
+          </a:bodyPr>
+          <a:lstStyle/>
+          <a:p>
+            <a:r>
+              <a:rPr lang="pt-BR" dirty="0" smtClean="0"/>
+              <a:t>RESUMO CAMPANHA</a:t>
+            </a:r>
+            <a:endParaRPr lang="pt-BR" dirty="0"/>
+          </a:p>
+        </p:txBody>
+      </p:sp>
+      <p:sp>
+        <p:nvSpPr>
+          <p:cNvPr id="8" name="Retângulo 7"/>
+          <p:cNvSpPr/>
+          <p:nvPr/>
+        </p:nvSpPr>
+        <p:spPr>
+          <a:xfrm>
+            <a:off x="6953944" y="1844824"/>
+            <a:ext cx="1434480" cy="369332"/>
+          </a:xfrm>
+          <a:prstGeom prst="rect">
+            <a:avLst/>
+          </a:prstGeom>
+        </p:spPr>
+        <p:style>
+          <a:lnRef idx="2">
+            <a:schemeClr val="accent1">
+              <a:shade val="50000"/>
+            </a:schemeClr>
+          </a:lnRef>
+          <a:fillRef idx="1">
+            <a:schemeClr val="accent1"/>
+          </a:fillRef>
+          <a:effectRef idx="0">
+            <a:schemeClr val="accent1"/>
+          </a:effectRef>
+          <a:fontRef idx="minor">
+            <a:schemeClr val="lt1"/>
+          </a:fontRef>
+        </p:style>
+        <p:txBody>
+          <a:bodyPr rtlCol="0" anchor="ctr"/>
+          <a:lstStyle/>
+          <a:p>
+            <a:pPr algn="ctr"/>
+            <a:r>
+              <a:rPr lang="pt-BR" dirty="0" smtClean="0"/>
+              <a:t>CANDIDATAR</a:t>
+            </a:r>
+            <a:endParaRPr lang="pt-BR" dirty="0"/>
+          </a:p>
+        </p:txBody>
+      </p:sp>
+      <p:sp>
+        <p:nvSpPr>
+          <p:cNvPr id="19" name="CaixaDeTexto 18"/>
+          <p:cNvSpPr txBox="1"/>
+          <p:nvPr/>
+        </p:nvSpPr>
+        <p:spPr>
+          <a:xfrm>
+            <a:off x="251520" y="2492896"/>
+            <a:ext cx="2651751" cy="369332"/>
+          </a:xfrm>
+          <a:prstGeom prst="rect">
+            <a:avLst/>
+          </a:prstGeom>
+          <a:noFill/>
+          <a:ln>
+            <a:solidFill>
+              <a:schemeClr val="tx1"/>
+            </a:solidFill>
+          </a:ln>
+        </p:spPr>
+        <p:txBody>
+          <a:bodyPr wrap="square" rtlCol="0">
+            <a:spAutoFit/>
+          </a:bodyPr>
+          <a:lstStyle/>
+          <a:p>
+            <a:pPr algn="ctr"/>
+            <a:r>
+              <a:rPr lang="pt-BR" dirty="0" smtClean="0"/>
+              <a:t>IMAGEM DA CAMPANHA</a:t>
+            </a:r>
+            <a:endParaRPr lang="pt-BR" dirty="0"/>
+          </a:p>
+        </p:txBody>
+      </p:sp>
+      <p:sp>
+        <p:nvSpPr>
+          <p:cNvPr id="20" name="CaixaDeTexto 19"/>
+          <p:cNvSpPr txBox="1"/>
+          <p:nvPr/>
+        </p:nvSpPr>
+        <p:spPr>
+          <a:xfrm>
+            <a:off x="3131840" y="2492896"/>
+            <a:ext cx="3058180" cy="369332"/>
+          </a:xfrm>
+          <a:prstGeom prst="rect">
+            <a:avLst/>
+          </a:prstGeom>
+          <a:noFill/>
+          <a:ln>
+            <a:solidFill>
+              <a:schemeClr val="tx1"/>
+            </a:solidFill>
+          </a:ln>
+        </p:spPr>
+        <p:txBody>
+          <a:bodyPr wrap="square" rtlCol="0">
+            <a:spAutoFit/>
+          </a:bodyPr>
+          <a:lstStyle/>
+          <a:p>
+            <a:r>
+              <a:rPr lang="pt-BR" dirty="0" smtClean="0"/>
+              <a:t>RESUMO CAMPANHA</a:t>
+            </a:r>
+            <a:endParaRPr lang="pt-BR" dirty="0"/>
+          </a:p>
+        </p:txBody>
+      </p:sp>
+      <p:sp>
+        <p:nvSpPr>
+          <p:cNvPr id="21" name="Retângulo 20"/>
+          <p:cNvSpPr/>
+          <p:nvPr/>
+        </p:nvSpPr>
+        <p:spPr>
+          <a:xfrm>
+            <a:off x="6953944" y="2492896"/>
+            <a:ext cx="1434480" cy="369332"/>
+          </a:xfrm>
+          <a:prstGeom prst="rect">
+            <a:avLst/>
+          </a:prstGeom>
+        </p:spPr>
+        <p:style>
+          <a:lnRef idx="2">
+            <a:schemeClr val="accent1">
+              <a:shade val="50000"/>
+            </a:schemeClr>
+          </a:lnRef>
+          <a:fillRef idx="1">
+            <a:schemeClr val="accent1"/>
+          </a:fillRef>
+          <a:effectRef idx="0">
+            <a:schemeClr val="accent1"/>
+          </a:effectRef>
+          <a:fontRef idx="minor">
+            <a:schemeClr val="lt1"/>
+          </a:fontRef>
+        </p:style>
+        <p:txBody>
+          <a:bodyPr rtlCol="0" anchor="ctr"/>
+          <a:lstStyle/>
+          <a:p>
+            <a:pPr algn="ctr"/>
+            <a:r>
+              <a:rPr lang="pt-BR" dirty="0" smtClean="0"/>
+              <a:t>CANDIDATAR</a:t>
+            </a:r>
+            <a:endParaRPr lang="pt-BR" dirty="0"/>
+          </a:p>
+        </p:txBody>
+      </p:sp>
+      <p:sp>
+        <p:nvSpPr>
+          <p:cNvPr id="22" name="CaixaDeTexto 21"/>
+          <p:cNvSpPr txBox="1"/>
+          <p:nvPr/>
+        </p:nvSpPr>
+        <p:spPr>
+          <a:xfrm>
+            <a:off x="267932" y="3198388"/>
+            <a:ext cx="2651751" cy="369332"/>
+          </a:xfrm>
+          <a:prstGeom prst="rect">
+            <a:avLst/>
+          </a:prstGeom>
+          <a:noFill/>
+          <a:ln>
+            <a:solidFill>
+              <a:schemeClr val="tx1"/>
+            </a:solidFill>
+          </a:ln>
+        </p:spPr>
+        <p:txBody>
+          <a:bodyPr wrap="square" rtlCol="0">
+            <a:spAutoFit/>
+          </a:bodyPr>
+          <a:lstStyle/>
+          <a:p>
+            <a:pPr algn="ctr"/>
+            <a:r>
+              <a:rPr lang="pt-BR" dirty="0" smtClean="0"/>
+              <a:t>IMAGEM DA CAMPANHA</a:t>
+            </a:r>
+            <a:endParaRPr lang="pt-BR" dirty="0"/>
+          </a:p>
+        </p:txBody>
+      </p:sp>
+      <p:sp>
+        <p:nvSpPr>
+          <p:cNvPr id="23" name="CaixaDeTexto 22"/>
+          <p:cNvSpPr txBox="1"/>
+          <p:nvPr/>
+        </p:nvSpPr>
+        <p:spPr>
+          <a:xfrm>
+            <a:off x="3148252" y="3198388"/>
+            <a:ext cx="3058180" cy="369332"/>
+          </a:xfrm>
+          <a:prstGeom prst="rect">
+            <a:avLst/>
+          </a:prstGeom>
+          <a:noFill/>
+          <a:ln>
+            <a:solidFill>
+              <a:schemeClr val="tx1"/>
+            </a:solidFill>
+          </a:ln>
+        </p:spPr>
+        <p:txBody>
+          <a:bodyPr wrap="square" rtlCol="0">
+            <a:spAutoFit/>
+          </a:bodyPr>
+          <a:lstStyle/>
+          <a:p>
+            <a:r>
+              <a:rPr lang="pt-BR" dirty="0" smtClean="0"/>
+              <a:t>RESUMO CAMPANHA</a:t>
+            </a:r>
+            <a:endParaRPr lang="pt-BR" dirty="0"/>
+          </a:p>
+        </p:txBody>
+      </p:sp>
+      <p:sp>
+        <p:nvSpPr>
+          <p:cNvPr id="24" name="Retângulo 23"/>
+          <p:cNvSpPr/>
+          <p:nvPr/>
+        </p:nvSpPr>
+        <p:spPr>
+          <a:xfrm>
+            <a:off x="6970356" y="3198388"/>
+            <a:ext cx="1434480" cy="369332"/>
+          </a:xfrm>
+          <a:prstGeom prst="rect">
+            <a:avLst/>
+          </a:prstGeom>
+        </p:spPr>
+        <p:style>
+          <a:lnRef idx="2">
+            <a:schemeClr val="accent1">
+              <a:shade val="50000"/>
+            </a:schemeClr>
+          </a:lnRef>
+          <a:fillRef idx="1">
+            <a:schemeClr val="accent1"/>
+          </a:fillRef>
+          <a:effectRef idx="0">
+            <a:schemeClr val="accent1"/>
+          </a:effectRef>
+          <a:fontRef idx="minor">
+            <a:schemeClr val="lt1"/>
+          </a:fontRef>
+        </p:style>
+        <p:txBody>
+          <a:bodyPr rtlCol="0" anchor="ctr"/>
+          <a:lstStyle/>
+          <a:p>
+            <a:pPr algn="ctr"/>
+            <a:r>
+              <a:rPr lang="pt-BR" dirty="0" smtClean="0"/>
+              <a:t>CANDIDATAR</a:t>
+            </a:r>
+            <a:endParaRPr lang="pt-BR" dirty="0"/>
+          </a:p>
+        </p:txBody>
+      </p:sp>
+      <p:sp>
+        <p:nvSpPr>
+          <p:cNvPr id="25" name="CaixaDeTexto 24"/>
+          <p:cNvSpPr txBox="1"/>
+          <p:nvPr/>
+        </p:nvSpPr>
+        <p:spPr>
+          <a:xfrm>
+            <a:off x="269179" y="3933056"/>
+            <a:ext cx="2651751" cy="369332"/>
+          </a:xfrm>
+          <a:prstGeom prst="rect">
+            <a:avLst/>
+          </a:prstGeom>
+          <a:noFill/>
+          <a:ln>
+            <a:solidFill>
+              <a:schemeClr val="tx1"/>
+            </a:solidFill>
+          </a:ln>
+        </p:spPr>
+        <p:txBody>
+          <a:bodyPr wrap="square" rtlCol="0">
+            <a:spAutoFit/>
+          </a:bodyPr>
+          <a:lstStyle/>
+          <a:p>
+            <a:pPr algn="ctr"/>
+            <a:r>
+              <a:rPr lang="pt-BR" dirty="0" smtClean="0"/>
+              <a:t>IMAGEM DA CAMPANHA</a:t>
+            </a:r>
+            <a:endParaRPr lang="pt-BR" dirty="0"/>
+          </a:p>
+        </p:txBody>
+      </p:sp>
+      <p:sp>
+        <p:nvSpPr>
+          <p:cNvPr id="26" name="CaixaDeTexto 25"/>
+          <p:cNvSpPr txBox="1"/>
+          <p:nvPr/>
+        </p:nvSpPr>
+        <p:spPr>
+          <a:xfrm>
+            <a:off x="3149499" y="3933056"/>
+            <a:ext cx="3058180" cy="369332"/>
+          </a:xfrm>
+          <a:prstGeom prst="rect">
+            <a:avLst/>
+          </a:prstGeom>
+          <a:noFill/>
+          <a:ln>
+            <a:solidFill>
+              <a:schemeClr val="tx1"/>
+            </a:solidFill>
+          </a:ln>
+        </p:spPr>
+        <p:txBody>
+          <a:bodyPr wrap="square" rtlCol="0">
+            <a:spAutoFit/>
+          </a:bodyPr>
+          <a:lstStyle/>
+          <a:p>
+            <a:r>
+              <a:rPr lang="pt-BR" dirty="0" smtClean="0"/>
+              <a:t>RESUMO CAMPANHA</a:t>
+            </a:r>
+            <a:endParaRPr lang="pt-BR" dirty="0"/>
+          </a:p>
+        </p:txBody>
+      </p:sp>
+      <p:sp>
+        <p:nvSpPr>
+          <p:cNvPr id="27" name="Retângulo 26"/>
+          <p:cNvSpPr/>
+          <p:nvPr/>
+        </p:nvSpPr>
+        <p:spPr>
+          <a:xfrm>
+            <a:off x="6971603" y="3933056"/>
+            <a:ext cx="1434480" cy="369332"/>
+          </a:xfrm>
+          <a:prstGeom prst="rect">
+            <a:avLst/>
+          </a:prstGeom>
+        </p:spPr>
+        <p:style>
+          <a:lnRef idx="2">
+            <a:schemeClr val="accent1">
+              <a:shade val="50000"/>
+            </a:schemeClr>
+          </a:lnRef>
+          <a:fillRef idx="1">
+            <a:schemeClr val="accent1"/>
+          </a:fillRef>
+          <a:effectRef idx="0">
+            <a:schemeClr val="accent1"/>
+          </a:effectRef>
+          <a:fontRef idx="minor">
+            <a:schemeClr val="lt1"/>
+          </a:fontRef>
+        </p:style>
+        <p:txBody>
+          <a:bodyPr rtlCol="0" anchor="ctr"/>
+          <a:lstStyle/>
+          <a:p>
+            <a:pPr algn="ctr"/>
+            <a:r>
+              <a:rPr lang="pt-BR" dirty="0" smtClean="0"/>
+              <a:t>CANDIDATAR</a:t>
+            </a:r>
+            <a:endParaRPr lang="pt-BR" dirty="0"/>
+          </a:p>
+        </p:txBody>
+      </p:sp>
+      <p:sp>
+        <p:nvSpPr>
+          <p:cNvPr id="28" name="CaixaDeTexto 27"/>
+          <p:cNvSpPr txBox="1"/>
+          <p:nvPr/>
+        </p:nvSpPr>
+        <p:spPr>
+          <a:xfrm>
+            <a:off x="4641869" y="961892"/>
+            <a:ext cx="3071548" cy="369332"/>
+          </a:xfrm>
+          <a:prstGeom prst="rect">
+            <a:avLst/>
+          </a:prstGeom>
+          <a:noFill/>
+          <a:ln>
+            <a:solidFill>
+              <a:schemeClr val="tx1"/>
+            </a:solidFill>
+          </a:ln>
+        </p:spPr>
+        <p:txBody>
+          <a:bodyPr wrap="square" rtlCol="0">
+            <a:spAutoFit/>
+          </a:bodyPr>
+          <a:lstStyle/>
+          <a:p>
+            <a:pPr algn="ctr"/>
+            <a:r>
+              <a:rPr lang="pt-BR" dirty="0" smtClean="0"/>
+              <a:t>MINHAS CAMPANHAS</a:t>
+            </a:r>
+            <a:endParaRPr lang="pt-BR" dirty="0"/>
+          </a:p>
+        </p:txBody>
+      </p:sp>
+      <p:sp>
+        <p:nvSpPr>
+          <p:cNvPr id="9" name="Retângulo 8"/>
+          <p:cNvSpPr/>
+          <p:nvPr/>
+        </p:nvSpPr>
+        <p:spPr>
+          <a:xfrm>
+            <a:off x="8037454" y="961892"/>
+            <a:ext cx="936104" cy="328891"/>
+          </a:xfrm>
+          <a:prstGeom prst="rect">
+            <a:avLst/>
+          </a:prstGeom>
+        </p:spPr>
+        <p:style>
+          <a:lnRef idx="2">
+            <a:schemeClr val="accent1">
+              <a:shade val="50000"/>
+            </a:schemeClr>
+          </a:lnRef>
+          <a:fillRef idx="1">
+            <a:schemeClr val="accent1"/>
+          </a:fillRef>
+          <a:effectRef idx="0">
+            <a:schemeClr val="accent1"/>
+          </a:effectRef>
+          <a:fontRef idx="minor">
+            <a:schemeClr val="lt1"/>
+          </a:fontRef>
+        </p:style>
+        <p:txBody>
+          <a:bodyPr rtlCol="0" anchor="ctr"/>
+          <a:lstStyle/>
+          <a:p>
+            <a:pPr algn="ctr"/>
+            <a:r>
+              <a:rPr lang="pt-BR" dirty="0" smtClean="0"/>
+              <a:t>FILTRAR</a:t>
+            </a:r>
+            <a:endParaRPr lang="pt-BR" dirty="0"/>
+          </a:p>
+        </p:txBody>
+      </p:sp>
     </p:spTree>
     <p:extLst>
       <p:ext uri="{BB962C8B-B14F-4D97-AF65-F5344CB8AC3E}">
-        <p14:creationId xmlns:p14="http://schemas.microsoft.com/office/powerpoint/2010/main" val="1651503836"/>
+        <p14:creationId xmlns:p14="http://schemas.microsoft.com/office/powerpoint/2010/main" val="4014494303"/>
       </p:ext>
     </p:extLst>
   </p:cSld>
@@ -7636,6 +7653,559 @@
     <p:extLst>
       <p:ext uri="{BB962C8B-B14F-4D97-AF65-F5344CB8AC3E}">
         <p14:creationId xmlns:p14="http://schemas.microsoft.com/office/powerpoint/2010/main" val="1722044830"/>
+      </p:ext>
+    </p:extLst>
+  </p:cSld>
+  <p:clrMapOvr>
+    <a:masterClrMapping/>
+  </p:clrMapOvr>
+  <p:timing>
+    <p:tnLst>
+      <p:par>
+        <p:cTn id="1" dur="indefinite" restart="never" nodeType="tmRoot"/>
+      </p:par>
+    </p:tnLst>
+  </p:timing>
+</p:sld>
+</file>
+
+<file path=ppt/slides/slide9.xml><?xml version="1.0" encoding="utf-8"?>
+<p:sld xmlns:a="http://schemas.openxmlformats.org/drawingml/2006/main" xmlns:r="http://schemas.openxmlformats.org/officeDocument/2006/relationships" xmlns:p="http://schemas.openxmlformats.org/presentationml/2006/main">
+  <p:cSld>
+    <p:spTree>
+      <p:nvGrpSpPr>
+        <p:cNvPr id="1" name=""/>
+        <p:cNvGrpSpPr/>
+        <p:nvPr/>
+      </p:nvGrpSpPr>
+      <p:grpSpPr>
+        <a:xfrm>
+          <a:off x="0" y="0"/>
+          <a:ext cx="0" cy="0"/>
+          <a:chOff x="0" y="0"/>
+          <a:chExt cx="0" cy="0"/>
+        </a:xfrm>
+      </p:grpSpPr>
+      <p:sp>
+        <p:nvSpPr>
+          <p:cNvPr id="4" name="Elipse 3"/>
+          <p:cNvSpPr/>
+          <p:nvPr/>
+        </p:nvSpPr>
+        <p:spPr>
+          <a:xfrm>
+            <a:off x="3609618" y="1635969"/>
+            <a:ext cx="1512168" cy="1512168"/>
+          </a:xfrm>
+          <a:prstGeom prst="ellipse">
+            <a:avLst/>
+          </a:prstGeom>
+          <a:noFill/>
+        </p:spPr>
+        <p:style>
+          <a:lnRef idx="2">
+            <a:schemeClr val="accent1">
+              <a:shade val="50000"/>
+            </a:schemeClr>
+          </a:lnRef>
+          <a:fillRef idx="1">
+            <a:schemeClr val="accent1"/>
+          </a:fillRef>
+          <a:effectRef idx="0">
+            <a:schemeClr val="accent1"/>
+          </a:effectRef>
+          <a:fontRef idx="minor">
+            <a:schemeClr val="lt1"/>
+          </a:fontRef>
+        </p:style>
+        <p:txBody>
+          <a:bodyPr rtlCol="0" anchor="ctr"/>
+          <a:lstStyle/>
+          <a:p>
+            <a:pPr algn="ctr"/>
+            <a:endParaRPr lang="es-US"/>
+          </a:p>
+        </p:txBody>
+      </p:sp>
+      <p:pic>
+        <p:nvPicPr>
+          <p:cNvPr id="7" name="Imagen 6"/>
+          <p:cNvPicPr>
+            <a:picLocks noChangeAspect="1"/>
+          </p:cNvPicPr>
+          <p:nvPr/>
+        </p:nvPicPr>
+        <p:blipFill>
+          <a:blip r:embed="rId2"/>
+          <a:stretch>
+            <a:fillRect/>
+          </a:stretch>
+        </p:blipFill>
+        <p:spPr>
+          <a:xfrm>
+            <a:off x="3006483" y="3717032"/>
+            <a:ext cx="1112399" cy="1152128"/>
+          </a:xfrm>
+          <a:prstGeom prst="rect">
+            <a:avLst/>
+          </a:prstGeom>
+        </p:spPr>
+      </p:pic>
+      <p:pic>
+        <p:nvPicPr>
+          <p:cNvPr id="2052" name="Picture 4" descr="Imagen relacionada"/>
+          <p:cNvPicPr>
+            <a:picLocks noChangeAspect="1" noChangeArrowheads="1"/>
+          </p:cNvPicPr>
+          <p:nvPr/>
+        </p:nvPicPr>
+        <p:blipFill rotWithShape="1">
+          <a:blip r:embed="rId3" cstate="print">
+            <a:extLst>
+              <a:ext uri="{28A0092B-C50C-407E-A947-70E740481C1C}">
+                <a14:useLocalDpi xmlns:a14="http://schemas.microsoft.com/office/drawing/2010/main" val="0"/>
+              </a:ext>
+            </a:extLst>
+          </a:blip>
+          <a:srcRect t="7992" r="5966"/>
+          <a:stretch/>
+        </p:blipFill>
+        <p:spPr bwMode="auto">
+          <a:xfrm>
+            <a:off x="6300193" y="908720"/>
+            <a:ext cx="1512168" cy="1479588"/>
+          </a:xfrm>
+          <a:prstGeom prst="rect">
+            <a:avLst/>
+          </a:prstGeom>
+          <a:noFill/>
+          <a:extLst>
+            <a:ext uri="{909E8E84-426E-40DD-AFC4-6F175D3DCCD1}">
+              <a14:hiddenFill xmlns:a14="http://schemas.microsoft.com/office/drawing/2010/main">
+                <a:solidFill>
+                  <a:srgbClr val="FFFFFF"/>
+                </a:solidFill>
+              </a14:hiddenFill>
+            </a:ext>
+          </a:extLst>
+        </p:spPr>
+      </p:pic>
+      <p:sp>
+        <p:nvSpPr>
+          <p:cNvPr id="11" name="Elipse 10"/>
+          <p:cNvSpPr/>
+          <p:nvPr/>
+        </p:nvSpPr>
+        <p:spPr>
+          <a:xfrm>
+            <a:off x="899592" y="836712"/>
+            <a:ext cx="1512168" cy="1476164"/>
+          </a:xfrm>
+          <a:prstGeom prst="ellipse">
+            <a:avLst/>
+          </a:prstGeom>
+          <a:solidFill>
+            <a:schemeClr val="bg2"/>
+          </a:solidFill>
+        </p:spPr>
+        <p:style>
+          <a:lnRef idx="2">
+            <a:schemeClr val="accent1">
+              <a:shade val="50000"/>
+            </a:schemeClr>
+          </a:lnRef>
+          <a:fillRef idx="1">
+            <a:schemeClr val="accent1"/>
+          </a:fillRef>
+          <a:effectRef idx="0">
+            <a:schemeClr val="accent1"/>
+          </a:effectRef>
+          <a:fontRef idx="minor">
+            <a:schemeClr val="lt1"/>
+          </a:fontRef>
+        </p:style>
+        <p:txBody>
+          <a:bodyPr rtlCol="0" anchor="ctr"/>
+          <a:lstStyle/>
+          <a:p>
+            <a:pPr algn="ctr"/>
+            <a:endParaRPr lang="es-US"/>
+          </a:p>
+        </p:txBody>
+      </p:sp>
+      <p:pic>
+        <p:nvPicPr>
+          <p:cNvPr id="2054" name="Picture 6" descr="https://www.iconpacks.net/icons/2/free-user-camera-icon-3354-thumb.png"/>
+          <p:cNvPicPr>
+            <a:picLocks noChangeAspect="1" noChangeArrowheads="1"/>
+          </p:cNvPicPr>
+          <p:nvPr/>
+        </p:nvPicPr>
+        <p:blipFill>
+          <a:blip r:embed="rId4" cstate="print">
+            <a:extLst>
+              <a:ext uri="{28A0092B-C50C-407E-A947-70E740481C1C}">
+                <a14:useLocalDpi xmlns:a14="http://schemas.microsoft.com/office/drawing/2010/main" val="0"/>
+              </a:ext>
+            </a:extLst>
+          </a:blip>
+          <a:srcRect/>
+          <a:stretch>
+            <a:fillRect/>
+          </a:stretch>
+        </p:blipFill>
+        <p:spPr bwMode="auto">
+          <a:xfrm>
+            <a:off x="1105097" y="944724"/>
+            <a:ext cx="1188132" cy="1188132"/>
+          </a:xfrm>
+          <a:prstGeom prst="rect">
+            <a:avLst/>
+          </a:prstGeom>
+          <a:noFill/>
+          <a:extLst>
+            <a:ext uri="{909E8E84-426E-40DD-AFC4-6F175D3DCCD1}">
+              <a14:hiddenFill xmlns:a14="http://schemas.microsoft.com/office/drawing/2010/main">
+                <a:solidFill>
+                  <a:srgbClr val="FFFFFF"/>
+                </a:solidFill>
+              </a14:hiddenFill>
+            </a:ext>
+          </a:extLst>
+        </p:spPr>
+      </p:pic>
+      <p:pic>
+        <p:nvPicPr>
+          <p:cNvPr id="8" name="Imagen 7"/>
+          <p:cNvPicPr>
+            <a:picLocks noChangeAspect="1"/>
+          </p:cNvPicPr>
+          <p:nvPr/>
+        </p:nvPicPr>
+        <p:blipFill>
+          <a:blip r:embed="rId5"/>
+          <a:stretch>
+            <a:fillRect/>
+          </a:stretch>
+        </p:blipFill>
+        <p:spPr>
+          <a:xfrm>
+            <a:off x="4716016" y="3822231"/>
+            <a:ext cx="1080120" cy="1054403"/>
+          </a:xfrm>
+          <a:prstGeom prst="rect">
+            <a:avLst/>
+          </a:prstGeom>
+        </p:spPr>
+      </p:pic>
+      <p:sp>
+        <p:nvSpPr>
+          <p:cNvPr id="14" name="Elipse 13"/>
+          <p:cNvSpPr/>
+          <p:nvPr/>
+        </p:nvSpPr>
+        <p:spPr>
+          <a:xfrm>
+            <a:off x="788290" y="2526087"/>
+            <a:ext cx="1512168" cy="1476164"/>
+          </a:xfrm>
+          <a:prstGeom prst="ellipse">
+            <a:avLst/>
+          </a:prstGeom>
+          <a:solidFill>
+            <a:schemeClr val="bg2"/>
+          </a:solidFill>
+        </p:spPr>
+        <p:style>
+          <a:lnRef idx="2">
+            <a:schemeClr val="accent1">
+              <a:shade val="50000"/>
+            </a:schemeClr>
+          </a:lnRef>
+          <a:fillRef idx="1">
+            <a:schemeClr val="accent1"/>
+          </a:fillRef>
+          <a:effectRef idx="0">
+            <a:schemeClr val="accent1"/>
+          </a:effectRef>
+          <a:fontRef idx="minor">
+            <a:schemeClr val="lt1"/>
+          </a:fontRef>
+        </p:style>
+        <p:txBody>
+          <a:bodyPr rtlCol="0" anchor="ctr"/>
+          <a:lstStyle/>
+          <a:p>
+            <a:pPr algn="ctr"/>
+            <a:endParaRPr lang="es-US"/>
+          </a:p>
+        </p:txBody>
+      </p:sp>
+      <p:pic>
+        <p:nvPicPr>
+          <p:cNvPr id="2050" name="Picture 2" descr="Imagen relacionada"/>
+          <p:cNvPicPr>
+            <a:picLocks noChangeAspect="1" noChangeArrowheads="1"/>
+          </p:cNvPicPr>
+          <p:nvPr/>
+        </p:nvPicPr>
+        <p:blipFill>
+          <a:blip r:embed="rId6" cstate="print">
+            <a:extLst>
+              <a:ext uri="{28A0092B-C50C-407E-A947-70E740481C1C}">
+                <a14:useLocalDpi xmlns:a14="http://schemas.microsoft.com/office/drawing/2010/main" val="0"/>
+              </a:ext>
+            </a:extLst>
+          </a:blip>
+          <a:srcRect/>
+          <a:stretch>
+            <a:fillRect/>
+          </a:stretch>
+        </p:blipFill>
+        <p:spPr bwMode="auto">
+          <a:xfrm>
+            <a:off x="951023" y="3054102"/>
+            <a:ext cx="1254238" cy="953996"/>
+          </a:xfrm>
+          <a:prstGeom prst="rect">
+            <a:avLst/>
+          </a:prstGeom>
+          <a:noFill/>
+          <a:extLst>
+            <a:ext uri="{909E8E84-426E-40DD-AFC4-6F175D3DCCD1}">
+              <a14:hiddenFill xmlns:a14="http://schemas.microsoft.com/office/drawing/2010/main">
+                <a:solidFill>
+                  <a:srgbClr val="FFFFFF"/>
+                </a:solidFill>
+              </a14:hiddenFill>
+            </a:ext>
+          </a:extLst>
+        </p:spPr>
+      </p:pic>
+      <p:sp>
+        <p:nvSpPr>
+          <p:cNvPr id="5" name="CuadroTexto 4"/>
+          <p:cNvSpPr txBox="1"/>
+          <p:nvPr/>
+        </p:nvSpPr>
+        <p:spPr>
+          <a:xfrm>
+            <a:off x="883427" y="2646413"/>
+            <a:ext cx="1430968" cy="646331"/>
+          </a:xfrm>
+          <a:prstGeom prst="rect">
+            <a:avLst/>
+          </a:prstGeom>
+          <a:noFill/>
+        </p:spPr>
+        <p:txBody>
+          <a:bodyPr wrap="square" rtlCol="0">
+            <a:spAutoFit/>
+          </a:bodyPr>
+          <a:lstStyle/>
+          <a:p>
+            <a:r>
+              <a:rPr lang="pt-BR" sz="3600" dirty="0" smtClean="0">
+                <a:solidFill>
+                  <a:schemeClr val="accent1">
+                    <a:lumMod val="75000"/>
+                  </a:schemeClr>
+                </a:solidFill>
+                <a:effectLst>
+                  <a:outerShdw blurRad="38100" dist="38100" dir="2700000" algn="tl">
+                    <a:srgbClr val="000000">
+                      <a:alpha val="43137"/>
+                    </a:srgbClr>
+                  </a:outerShdw>
+                </a:effectLst>
+              </a:rPr>
+              <a:t>Marca</a:t>
+            </a:r>
+            <a:endParaRPr lang="es-US" sz="3600" dirty="0">
+              <a:solidFill>
+                <a:schemeClr val="accent1">
+                  <a:lumMod val="75000"/>
+                </a:schemeClr>
+              </a:solidFill>
+              <a:effectLst>
+                <a:outerShdw blurRad="38100" dist="38100" dir="2700000" algn="tl">
+                  <a:srgbClr val="000000">
+                    <a:alpha val="43137"/>
+                  </a:srgbClr>
+                </a:outerShdw>
+              </a:effectLst>
+            </a:endParaRPr>
+          </a:p>
+        </p:txBody>
+      </p:sp>
+      <p:pic>
+        <p:nvPicPr>
+          <p:cNvPr id="9" name="Imagen 8"/>
+          <p:cNvPicPr>
+            <a:picLocks noChangeAspect="1"/>
+          </p:cNvPicPr>
+          <p:nvPr/>
+        </p:nvPicPr>
+        <p:blipFill>
+          <a:blip r:embed="rId7"/>
+          <a:stretch>
+            <a:fillRect/>
+          </a:stretch>
+        </p:blipFill>
+        <p:spPr>
+          <a:xfrm>
+            <a:off x="6393270" y="3717032"/>
+            <a:ext cx="1231032" cy="1044897"/>
+          </a:xfrm>
+          <a:prstGeom prst="rect">
+            <a:avLst/>
+          </a:prstGeom>
+        </p:spPr>
+      </p:pic>
+      <p:sp>
+        <p:nvSpPr>
+          <p:cNvPr id="17" name="Elipse 16"/>
+          <p:cNvSpPr/>
+          <p:nvPr/>
+        </p:nvSpPr>
+        <p:spPr>
+          <a:xfrm>
+            <a:off x="732095" y="4220795"/>
+            <a:ext cx="1512168" cy="1476164"/>
+          </a:xfrm>
+          <a:prstGeom prst="ellipse">
+            <a:avLst/>
+          </a:prstGeom>
+          <a:solidFill>
+            <a:schemeClr val="bg2"/>
+          </a:solidFill>
+        </p:spPr>
+        <p:style>
+          <a:lnRef idx="2">
+            <a:schemeClr val="accent1">
+              <a:shade val="50000"/>
+            </a:schemeClr>
+          </a:lnRef>
+          <a:fillRef idx="1">
+            <a:schemeClr val="accent1"/>
+          </a:fillRef>
+          <a:effectRef idx="0">
+            <a:schemeClr val="accent1"/>
+          </a:effectRef>
+          <a:fontRef idx="minor">
+            <a:schemeClr val="lt1"/>
+          </a:fontRef>
+        </p:style>
+        <p:txBody>
+          <a:bodyPr rtlCol="0" anchor="ctr"/>
+          <a:lstStyle/>
+          <a:p>
+            <a:pPr algn="ctr"/>
+            <a:endParaRPr lang="es-US"/>
+          </a:p>
+        </p:txBody>
+      </p:sp>
+      <p:pic>
+        <p:nvPicPr>
+          <p:cNvPr id="18" name="Picture 2" descr="Imagen relacionada"/>
+          <p:cNvPicPr>
+            <a:picLocks noChangeAspect="1" noChangeArrowheads="1"/>
+          </p:cNvPicPr>
+          <p:nvPr/>
+        </p:nvPicPr>
+        <p:blipFill>
+          <a:blip r:embed="rId6" cstate="print">
+            <a:extLst>
+              <a:ext uri="{28A0092B-C50C-407E-A947-70E740481C1C}">
+                <a14:useLocalDpi xmlns:a14="http://schemas.microsoft.com/office/drawing/2010/main" val="0"/>
+              </a:ext>
+            </a:extLst>
+          </a:blip>
+          <a:srcRect/>
+          <a:stretch>
+            <a:fillRect/>
+          </a:stretch>
+        </p:blipFill>
+        <p:spPr bwMode="auto">
+          <a:xfrm>
+            <a:off x="894259" y="4729760"/>
+            <a:ext cx="1254238" cy="953996"/>
+          </a:xfrm>
+          <a:prstGeom prst="rect">
+            <a:avLst/>
+          </a:prstGeom>
+          <a:noFill/>
+          <a:extLst>
+            <a:ext uri="{909E8E84-426E-40DD-AFC4-6F175D3DCCD1}">
+              <a14:hiddenFill xmlns:a14="http://schemas.microsoft.com/office/drawing/2010/main">
+                <a:solidFill>
+                  <a:srgbClr val="FFFFFF"/>
+                </a:solidFill>
+              </a14:hiddenFill>
+            </a:ext>
+          </a:extLst>
+        </p:spPr>
+      </p:pic>
+      <p:sp>
+        <p:nvSpPr>
+          <p:cNvPr id="19" name="CuadroTexto 18"/>
+          <p:cNvSpPr txBox="1"/>
+          <p:nvPr/>
+        </p:nvSpPr>
+        <p:spPr>
+          <a:xfrm>
+            <a:off x="799009" y="4448040"/>
+            <a:ext cx="1430968" cy="430887"/>
+          </a:xfrm>
+          <a:prstGeom prst="rect">
+            <a:avLst/>
+          </a:prstGeom>
+          <a:noFill/>
+        </p:spPr>
+        <p:txBody>
+          <a:bodyPr wrap="square" rtlCol="0">
+            <a:spAutoFit/>
+          </a:bodyPr>
+          <a:lstStyle/>
+          <a:p>
+            <a:r>
+              <a:rPr lang="pt-BR" sz="2200" dirty="0" smtClean="0">
+                <a:solidFill>
+                  <a:schemeClr val="accent2">
+                    <a:lumMod val="75000"/>
+                  </a:schemeClr>
+                </a:solidFill>
+                <a:effectLst>
+                  <a:outerShdw blurRad="38100" dist="38100" dir="2700000" algn="tl">
+                    <a:srgbClr val="000000">
+                      <a:alpha val="43137"/>
+                    </a:srgbClr>
+                  </a:outerShdw>
+                </a:effectLst>
+              </a:rPr>
+              <a:t>Campanha</a:t>
+            </a:r>
+            <a:endParaRPr lang="es-US" sz="2200" dirty="0">
+              <a:solidFill>
+                <a:schemeClr val="accent2">
+                  <a:lumMod val="75000"/>
+                </a:schemeClr>
+              </a:solidFill>
+              <a:effectLst>
+                <a:outerShdw blurRad="38100" dist="38100" dir="2700000" algn="tl">
+                  <a:srgbClr val="000000">
+                    <a:alpha val="43137"/>
+                  </a:srgbClr>
+                </a:outerShdw>
+              </a:effectLst>
+            </a:endParaRPr>
+          </a:p>
+        </p:txBody>
+      </p:sp>
+    </p:spTree>
+    <p:extLst>
+      <p:ext uri="{BB962C8B-B14F-4D97-AF65-F5344CB8AC3E}">
+        <p14:creationId xmlns:p14="http://schemas.microsoft.com/office/powerpoint/2010/main" val="3267530409"/>
       </p:ext>
     </p:extLst>
   </p:cSld>

</xml_diff>